<commit_message>
drawing NFA except the full one
</commit_message>
<xml_diff>
--- a/Graphs/NFA/NFA Drawing/1.pptx
+++ b/Graphs/NFA/NFA Drawing/1.pptx
@@ -6,7 +6,6 @@
   </p:sldMasterIdLst>
   <p:sldIdLst>
     <p:sldId id="256" r:id="rId2"/>
-    <p:sldId id="257" r:id="rId3"/>
   </p:sldIdLst>
   <p:sldSz cx="12192000" cy="6858000"/>
   <p:notesSz cx="6858000" cy="9144000"/>
@@ -260,7 +259,7 @@
           <a:p>
             <a:fld id="{730B001D-5C24-4F6D-9C38-E108FFB43397}" type="datetimeFigureOut">
               <a:rPr lang="en-US" smtClean="0"/>
-              <a:t>13-May-22</a:t>
+              <a:t>14-May-22</a:t>
             </a:fld>
             <a:endParaRPr lang="en-US"/>
           </a:p>
@@ -458,7 +457,7 @@
           <a:p>
             <a:fld id="{730B001D-5C24-4F6D-9C38-E108FFB43397}" type="datetimeFigureOut">
               <a:rPr lang="en-US" smtClean="0"/>
-              <a:t>13-May-22</a:t>
+              <a:t>14-May-22</a:t>
             </a:fld>
             <a:endParaRPr lang="en-US"/>
           </a:p>
@@ -666,7 +665,7 @@
           <a:p>
             <a:fld id="{730B001D-5C24-4F6D-9C38-E108FFB43397}" type="datetimeFigureOut">
               <a:rPr lang="en-US" smtClean="0"/>
-              <a:t>13-May-22</a:t>
+              <a:t>14-May-22</a:t>
             </a:fld>
             <a:endParaRPr lang="en-US"/>
           </a:p>
@@ -864,7 +863,7 @@
           <a:p>
             <a:fld id="{730B001D-5C24-4F6D-9C38-E108FFB43397}" type="datetimeFigureOut">
               <a:rPr lang="en-US" smtClean="0"/>
-              <a:t>13-May-22</a:t>
+              <a:t>14-May-22</a:t>
             </a:fld>
             <a:endParaRPr lang="en-US"/>
           </a:p>
@@ -1139,7 +1138,7 @@
           <a:p>
             <a:fld id="{730B001D-5C24-4F6D-9C38-E108FFB43397}" type="datetimeFigureOut">
               <a:rPr lang="en-US" smtClean="0"/>
-              <a:t>13-May-22</a:t>
+              <a:t>14-May-22</a:t>
             </a:fld>
             <a:endParaRPr lang="en-US"/>
           </a:p>
@@ -1404,7 +1403,7 @@
           <a:p>
             <a:fld id="{730B001D-5C24-4F6D-9C38-E108FFB43397}" type="datetimeFigureOut">
               <a:rPr lang="en-US" smtClean="0"/>
-              <a:t>13-May-22</a:t>
+              <a:t>14-May-22</a:t>
             </a:fld>
             <a:endParaRPr lang="en-US"/>
           </a:p>
@@ -1816,7 +1815,7 @@
           <a:p>
             <a:fld id="{730B001D-5C24-4F6D-9C38-E108FFB43397}" type="datetimeFigureOut">
               <a:rPr lang="en-US" smtClean="0"/>
-              <a:t>13-May-22</a:t>
+              <a:t>14-May-22</a:t>
             </a:fld>
             <a:endParaRPr lang="en-US"/>
           </a:p>
@@ -1957,7 +1956,7 @@
           <a:p>
             <a:fld id="{730B001D-5C24-4F6D-9C38-E108FFB43397}" type="datetimeFigureOut">
               <a:rPr lang="en-US" smtClean="0"/>
-              <a:t>13-May-22</a:t>
+              <a:t>14-May-22</a:t>
             </a:fld>
             <a:endParaRPr lang="en-US"/>
           </a:p>
@@ -2070,7 +2069,7 @@
           <a:p>
             <a:fld id="{730B001D-5C24-4F6D-9C38-E108FFB43397}" type="datetimeFigureOut">
               <a:rPr lang="en-US" smtClean="0"/>
-              <a:t>13-May-22</a:t>
+              <a:t>14-May-22</a:t>
             </a:fld>
             <a:endParaRPr lang="en-US"/>
           </a:p>
@@ -2381,7 +2380,7 @@
           <a:p>
             <a:fld id="{730B001D-5C24-4F6D-9C38-E108FFB43397}" type="datetimeFigureOut">
               <a:rPr lang="en-US" smtClean="0"/>
-              <a:t>13-May-22</a:t>
+              <a:t>14-May-22</a:t>
             </a:fld>
             <a:endParaRPr lang="en-US"/>
           </a:p>
@@ -2669,7 +2668,7 @@
           <a:p>
             <a:fld id="{730B001D-5C24-4F6D-9C38-E108FFB43397}" type="datetimeFigureOut">
               <a:rPr lang="en-US" smtClean="0"/>
-              <a:t>13-May-22</a:t>
+              <a:t>14-May-22</a:t>
             </a:fld>
             <a:endParaRPr lang="en-US"/>
           </a:p>
@@ -2910,7 +2909,7 @@
           <a:p>
             <a:fld id="{730B001D-5C24-4F6D-9C38-E108FFB43397}" type="datetimeFigureOut">
               <a:rPr lang="en-US" smtClean="0"/>
-              <a:t>13-May-22</a:t>
+              <a:t>14-May-22</a:t>
             </a:fld>
             <a:endParaRPr lang="en-US"/>
           </a:p>
@@ -3327,42 +3326,12 @@
           <a:chExt cx="0" cy="0"/>
         </a:xfrm>
       </p:grpSpPr>
-    </p:spTree>
-    <p:extLst>
-      <p:ext uri="{BB962C8B-B14F-4D97-AF65-F5344CB8AC3E}">
-        <p14:creationId xmlns:p14="http://schemas.microsoft.com/office/powerpoint/2010/main" val="174225236"/>
-      </p:ext>
-    </p:extLst>
-  </p:cSld>
-  <p:clrMapOvr>
-    <a:masterClrMapping/>
-  </p:clrMapOvr>
-</p:sld>
-</file>
-
-<file path=ppt/slides/slide2.xml><?xml version="1.0" encoding="utf-8"?>
-<p:sld xmlns:a="http://schemas.openxmlformats.org/drawingml/2006/main" xmlns:r="http://schemas.openxmlformats.org/officeDocument/2006/relationships" xmlns:p="http://schemas.openxmlformats.org/presentationml/2006/main">
-  <p:cSld>
-    <p:spTree>
-      <p:nvGrpSpPr>
-        <p:cNvPr id="1" name=""/>
-        <p:cNvGrpSpPr/>
-        <p:nvPr/>
-      </p:nvGrpSpPr>
-      <p:grpSpPr>
-        <a:xfrm>
-          <a:off x="0" y="0"/>
-          <a:ext cx="0" cy="0"/>
-          <a:chOff x="0" y="0"/>
-          <a:chExt cx="0" cy="0"/>
-        </a:xfrm>
-      </p:grpSpPr>
       <p:grpSp>
         <p:nvGrpSpPr>
-          <p:cNvPr id="63" name="Group 62">
-            <a:extLst>
-              <a:ext uri="{FF2B5EF4-FFF2-40B4-BE49-F238E27FC236}">
-                <a16:creationId xmlns:a16="http://schemas.microsoft.com/office/drawing/2014/main" id="{BE0BCB9C-71AF-542C-F0F3-EF10B3D07BBB}"/>
+          <p:cNvPr id="4" name="Group 3">
+            <a:extLst>
+              <a:ext uri="{FF2B5EF4-FFF2-40B4-BE49-F238E27FC236}">
+                <a16:creationId xmlns:a16="http://schemas.microsoft.com/office/drawing/2014/main" id="{7ED8537A-0922-C511-46CF-E34D2F2D7753}"/>
               </a:ext>
             </a:extLst>
           </p:cNvPr>
@@ -3371,7 +3340,7 @@
         </p:nvGrpSpPr>
         <p:grpSpPr>
           <a:xfrm>
-            <a:off x="627917" y="908092"/>
+            <a:off x="258640" y="3493030"/>
             <a:ext cx="1268794" cy="365760"/>
             <a:chOff x="627917" y="908092"/>
             <a:chExt cx="1268794" cy="365760"/>
@@ -3379,10 +3348,10 @@
         </p:grpSpPr>
         <p:sp>
           <p:nvSpPr>
-            <p:cNvPr id="40" name="TextBox 39">
+            <p:cNvPr id="5" name="TextBox 4">
               <a:extLst>
                 <a:ext uri="{FF2B5EF4-FFF2-40B4-BE49-F238E27FC236}">
-                  <a16:creationId xmlns:a16="http://schemas.microsoft.com/office/drawing/2014/main" id="{46BE09F0-8D72-DB42-E6A0-DCFF0C0817F3}"/>
+                  <a16:creationId xmlns:a16="http://schemas.microsoft.com/office/drawing/2014/main" id="{A94972F1-1543-596B-61FE-233632CF13C9}"/>
                 </a:ext>
               </a:extLst>
             </p:cNvPr>
@@ -3414,17 +3383,17 @@
         </p:sp>
         <p:cxnSp>
           <p:nvCxnSpPr>
-            <p:cNvPr id="41" name="Straight Arrow Connector 40">
+            <p:cNvPr id="6" name="Straight Arrow Connector 5">
               <a:extLst>
                 <a:ext uri="{FF2B5EF4-FFF2-40B4-BE49-F238E27FC236}">
-                  <a16:creationId xmlns:a16="http://schemas.microsoft.com/office/drawing/2014/main" id="{F0C2978E-D7AB-9663-D9D6-790ACE6CD17E}"/>
+                  <a16:creationId xmlns:a16="http://schemas.microsoft.com/office/drawing/2014/main" id="{FCD688F0-C764-884E-0843-2C05829D3AC9}"/>
                 </a:ext>
               </a:extLst>
             </p:cNvPr>
             <p:cNvCxnSpPr>
               <a:cxnSpLocks/>
-              <a:stCxn id="40" idx="3"/>
-              <a:endCxn id="42" idx="2"/>
+              <a:stCxn id="5" idx="3"/>
+              <a:endCxn id="7" idx="2"/>
             </p:cNvCxnSpPr>
             <p:nvPr/>
           </p:nvCxnSpPr>
@@ -3457,10 +3426,10 @@
         </p:cxnSp>
         <p:sp>
           <p:nvSpPr>
-            <p:cNvPr id="42" name="Oval 41">
+            <p:cNvPr id="7" name="Oval 6">
               <a:extLst>
                 <a:ext uri="{FF2B5EF4-FFF2-40B4-BE49-F238E27FC236}">
-                  <a16:creationId xmlns:a16="http://schemas.microsoft.com/office/drawing/2014/main" id="{4CB70878-1ADB-2C11-4314-F734D16ECA29}"/>
+                  <a16:creationId xmlns:a16="http://schemas.microsoft.com/office/drawing/2014/main" id="{02CE14AB-EE24-5823-AF0F-426281327E93}"/>
                 </a:ext>
               </a:extLst>
             </p:cNvPr>
@@ -3512,10 +3481,1428 @@
       </p:grpSp>
       <p:sp>
         <p:nvSpPr>
-          <p:cNvPr id="22" name="Oval 21">
-            <a:extLst>
-              <a:ext uri="{FF2B5EF4-FFF2-40B4-BE49-F238E27FC236}">
-                <a16:creationId xmlns:a16="http://schemas.microsoft.com/office/drawing/2014/main" id="{8CF77C6E-1D0A-F7FC-BD73-F6C713EF209F}"/>
+          <p:cNvPr id="8" name="Oval 7">
+            <a:extLst>
+              <a:ext uri="{FF2B5EF4-FFF2-40B4-BE49-F238E27FC236}">
+                <a16:creationId xmlns:a16="http://schemas.microsoft.com/office/drawing/2014/main" id="{F9EAA7AD-B405-766E-BAF8-20F7FB3A8EC4}"/>
+              </a:ext>
+            </a:extLst>
+          </p:cNvPr>
+          <p:cNvSpPr/>
+          <p:nvPr/>
+        </p:nvSpPr>
+        <p:spPr>
+          <a:xfrm>
+            <a:off x="2113468" y="3491230"/>
+            <a:ext cx="365760" cy="365760"/>
+          </a:xfrm>
+          <a:prstGeom prst="ellipse">
+            <a:avLst/>
+          </a:prstGeom>
+          <a:noFill/>
+        </p:spPr>
+        <p:style>
+          <a:lnRef idx="2">
+            <a:schemeClr val="dk1">
+              <a:shade val="50000"/>
+            </a:schemeClr>
+          </a:lnRef>
+          <a:fillRef idx="1">
+            <a:schemeClr val="dk1"/>
+          </a:fillRef>
+          <a:effectRef idx="0">
+            <a:schemeClr val="dk1"/>
+          </a:effectRef>
+          <a:fontRef idx="minor">
+            <a:schemeClr val="lt1"/>
+          </a:fontRef>
+        </p:style>
+        <p:txBody>
+          <a:bodyPr rtlCol="0" anchor="ctr"/>
+          <a:lstStyle/>
+          <a:p>
+            <a:pPr algn="ctr"/>
+            <a:r>
+              <a:rPr lang="ar-EG" sz="1600" dirty="0">
+                <a:solidFill>
+                  <a:schemeClr val="tx1"/>
+                </a:solidFill>
+              </a:rPr>
+              <a:t>1</a:t>
+            </a:r>
+            <a:endParaRPr lang="en-US" sz="1600" dirty="0">
+              <a:solidFill>
+                <a:schemeClr val="tx1"/>
+              </a:solidFill>
+            </a:endParaRPr>
+          </a:p>
+        </p:txBody>
+      </p:sp>
+      <p:grpSp>
+        <p:nvGrpSpPr>
+          <p:cNvPr id="9" name="Group 8">
+            <a:extLst>
+              <a:ext uri="{FF2B5EF4-FFF2-40B4-BE49-F238E27FC236}">
+                <a16:creationId xmlns:a16="http://schemas.microsoft.com/office/drawing/2014/main" id="{665D14D2-A7AC-9B5C-6FC0-D579BB09D7BD}"/>
+              </a:ext>
+            </a:extLst>
+          </p:cNvPr>
+          <p:cNvGrpSpPr/>
+          <p:nvPr/>
+        </p:nvGrpSpPr>
+        <p:grpSpPr>
+          <a:xfrm>
+            <a:off x="1527434" y="3634963"/>
+            <a:ext cx="586034" cy="230832"/>
+            <a:chOff x="2678461" y="2010614"/>
+            <a:chExt cx="586034" cy="230832"/>
+          </a:xfrm>
+        </p:grpSpPr>
+        <p:cxnSp>
+          <p:nvCxnSpPr>
+            <p:cNvPr id="10" name="Straight Arrow Connector 9">
+              <a:extLst>
+                <a:ext uri="{FF2B5EF4-FFF2-40B4-BE49-F238E27FC236}">
+                  <a16:creationId xmlns:a16="http://schemas.microsoft.com/office/drawing/2014/main" id="{1A83BF8E-61CC-80A9-406B-550B350D8DDF}"/>
+                </a:ext>
+              </a:extLst>
+            </p:cNvPr>
+            <p:cNvCxnSpPr>
+              <a:cxnSpLocks/>
+              <a:stCxn id="7" idx="6"/>
+              <a:endCxn id="8" idx="2"/>
+            </p:cNvCxnSpPr>
+            <p:nvPr/>
+          </p:nvCxnSpPr>
+          <p:spPr>
+            <a:xfrm flipV="1">
+              <a:off x="2678461" y="2049761"/>
+              <a:ext cx="586034" cy="1800"/>
+            </a:xfrm>
+            <a:prstGeom prst="straightConnector1">
+              <a:avLst/>
+            </a:prstGeom>
+            <a:ln w="9525">
+              <a:tailEnd type="triangle"/>
+            </a:ln>
+          </p:spPr>
+          <p:style>
+            <a:lnRef idx="1">
+              <a:schemeClr val="dk1"/>
+            </a:lnRef>
+            <a:fillRef idx="0">
+              <a:schemeClr val="dk1"/>
+            </a:fillRef>
+            <a:effectRef idx="0">
+              <a:schemeClr val="dk1"/>
+            </a:effectRef>
+            <a:fontRef idx="minor">
+              <a:schemeClr val="tx1"/>
+            </a:fontRef>
+          </p:style>
+        </p:cxnSp>
+        <p:sp>
+          <p:nvSpPr>
+            <p:cNvPr id="11" name="TextBox 10">
+              <a:extLst>
+                <a:ext uri="{FF2B5EF4-FFF2-40B4-BE49-F238E27FC236}">
+                  <a16:creationId xmlns:a16="http://schemas.microsoft.com/office/drawing/2014/main" id="{0DDA7CED-90EB-07BE-1C69-FB71590D1AB2}"/>
+                </a:ext>
+              </a:extLst>
+            </p:cNvPr>
+            <p:cNvSpPr txBox="1"/>
+            <p:nvPr/>
+          </p:nvSpPr>
+          <p:spPr>
+            <a:xfrm>
+              <a:off x="2842733" y="2010614"/>
+              <a:ext cx="150495" cy="230832"/>
+            </a:xfrm>
+            <a:prstGeom prst="rect">
+              <a:avLst/>
+            </a:prstGeom>
+            <a:noFill/>
+          </p:spPr>
+          <p:txBody>
+            <a:bodyPr wrap="square" rtlCol="0">
+              <a:spAutoFit/>
+            </a:bodyPr>
+            <a:lstStyle/>
+            <a:p>
+              <a:r>
+                <a:rPr lang="en-US" sz="900" b="1" dirty="0"/>
+                <a:t>C</a:t>
+              </a:r>
+            </a:p>
+          </p:txBody>
+        </p:sp>
+      </p:grpSp>
+      <p:sp>
+        <p:nvSpPr>
+          <p:cNvPr id="12" name="Oval 11">
+            <a:extLst>
+              <a:ext uri="{FF2B5EF4-FFF2-40B4-BE49-F238E27FC236}">
+                <a16:creationId xmlns:a16="http://schemas.microsoft.com/office/drawing/2014/main" id="{C5F75643-7BB4-A869-23D1-37BA4D20306D}"/>
+              </a:ext>
+            </a:extLst>
+          </p:cNvPr>
+          <p:cNvSpPr/>
+          <p:nvPr/>
+        </p:nvSpPr>
+        <p:spPr>
+          <a:xfrm>
+            <a:off x="9129794" y="3486150"/>
+            <a:ext cx="365760" cy="365760"/>
+          </a:xfrm>
+          <a:prstGeom prst="ellipse">
+            <a:avLst/>
+          </a:prstGeom>
+          <a:noFill/>
+          <a:ln w="34925" cmpd="dbl"/>
+        </p:spPr>
+        <p:style>
+          <a:lnRef idx="2">
+            <a:schemeClr val="dk1">
+              <a:shade val="50000"/>
+            </a:schemeClr>
+          </a:lnRef>
+          <a:fillRef idx="1">
+            <a:schemeClr val="dk1"/>
+          </a:fillRef>
+          <a:effectRef idx="0">
+            <a:schemeClr val="dk1"/>
+          </a:effectRef>
+          <a:fontRef idx="minor">
+            <a:schemeClr val="lt1"/>
+          </a:fontRef>
+        </p:style>
+        <p:txBody>
+          <a:bodyPr rtlCol="0" anchor="ctr"/>
+          <a:lstStyle/>
+          <a:p>
+            <a:pPr algn="ctr"/>
+            <a:r>
+              <a:rPr lang="ar-EG" sz="1600" dirty="0">
+                <a:solidFill>
+                  <a:schemeClr val="tx1"/>
+                </a:solidFill>
+              </a:rPr>
+              <a:t>8</a:t>
+            </a:r>
+            <a:endParaRPr lang="en-US" sz="1600" dirty="0">
+              <a:solidFill>
+                <a:schemeClr val="tx1"/>
+              </a:solidFill>
+            </a:endParaRPr>
+          </a:p>
+        </p:txBody>
+      </p:sp>
+      <p:grpSp>
+        <p:nvGrpSpPr>
+          <p:cNvPr id="23" name="Group 22">
+            <a:extLst>
+              <a:ext uri="{FF2B5EF4-FFF2-40B4-BE49-F238E27FC236}">
+                <a16:creationId xmlns:a16="http://schemas.microsoft.com/office/drawing/2014/main" id="{67C0D443-57E3-1256-ADF1-F3129F0ED1E6}"/>
+              </a:ext>
+            </a:extLst>
+          </p:cNvPr>
+          <p:cNvGrpSpPr/>
+          <p:nvPr/>
+        </p:nvGrpSpPr>
+        <p:grpSpPr>
+          <a:xfrm>
+            <a:off x="2479228" y="3650534"/>
+            <a:ext cx="626336" cy="230832"/>
+            <a:chOff x="2659938" y="2010614"/>
+            <a:chExt cx="626336" cy="230832"/>
+          </a:xfrm>
+        </p:grpSpPr>
+        <p:cxnSp>
+          <p:nvCxnSpPr>
+            <p:cNvPr id="24" name="Straight Arrow Connector 23">
+              <a:extLst>
+                <a:ext uri="{FF2B5EF4-FFF2-40B4-BE49-F238E27FC236}">
+                  <a16:creationId xmlns:a16="http://schemas.microsoft.com/office/drawing/2014/main" id="{C4589AE4-6143-1EB8-4133-2CEF49106EE4}"/>
+                </a:ext>
+              </a:extLst>
+            </p:cNvPr>
+            <p:cNvCxnSpPr>
+              <a:cxnSpLocks/>
+              <a:stCxn id="8" idx="6"/>
+              <a:endCxn id="26" idx="2"/>
+            </p:cNvCxnSpPr>
+            <p:nvPr/>
+          </p:nvCxnSpPr>
+          <p:spPr>
+            <a:xfrm>
+              <a:off x="2659938" y="2034190"/>
+              <a:ext cx="626336" cy="0"/>
+            </a:xfrm>
+            <a:prstGeom prst="straightConnector1">
+              <a:avLst/>
+            </a:prstGeom>
+            <a:ln w="9525">
+              <a:tailEnd type="triangle"/>
+            </a:ln>
+          </p:spPr>
+          <p:style>
+            <a:lnRef idx="1">
+              <a:schemeClr val="dk1"/>
+            </a:lnRef>
+            <a:fillRef idx="0">
+              <a:schemeClr val="dk1"/>
+            </a:fillRef>
+            <a:effectRef idx="0">
+              <a:schemeClr val="dk1"/>
+            </a:effectRef>
+            <a:fontRef idx="minor">
+              <a:schemeClr val="tx1"/>
+            </a:fontRef>
+          </p:style>
+        </p:cxnSp>
+        <p:sp>
+          <p:nvSpPr>
+            <p:cNvPr id="25" name="TextBox 24">
+              <a:extLst>
+                <a:ext uri="{FF2B5EF4-FFF2-40B4-BE49-F238E27FC236}">
+                  <a16:creationId xmlns:a16="http://schemas.microsoft.com/office/drawing/2014/main" id="{346E8892-77AC-B16D-9062-84C1FEAAB2D6}"/>
+                </a:ext>
+              </a:extLst>
+            </p:cNvPr>
+            <p:cNvSpPr txBox="1"/>
+            <p:nvPr/>
+          </p:nvSpPr>
+          <p:spPr>
+            <a:xfrm>
+              <a:off x="2842733" y="2010614"/>
+              <a:ext cx="150495" cy="230832"/>
+            </a:xfrm>
+            <a:prstGeom prst="rect">
+              <a:avLst/>
+            </a:prstGeom>
+            <a:noFill/>
+          </p:spPr>
+          <p:txBody>
+            <a:bodyPr wrap="square" rtlCol="0">
+              <a:spAutoFit/>
+            </a:bodyPr>
+            <a:lstStyle/>
+            <a:p>
+              <a:r>
+                <a:rPr lang="en-US" sz="900" b="1" dirty="0"/>
+                <a:t>a</a:t>
+              </a:r>
+            </a:p>
+          </p:txBody>
+        </p:sp>
+      </p:grpSp>
+      <p:sp>
+        <p:nvSpPr>
+          <p:cNvPr id="26" name="Oval 25">
+            <a:extLst>
+              <a:ext uri="{FF2B5EF4-FFF2-40B4-BE49-F238E27FC236}">
+                <a16:creationId xmlns:a16="http://schemas.microsoft.com/office/drawing/2014/main" id="{039FDFD4-AB32-F5E8-BD4D-58876F282B92}"/>
+              </a:ext>
+            </a:extLst>
+          </p:cNvPr>
+          <p:cNvSpPr/>
+          <p:nvPr/>
+        </p:nvSpPr>
+        <p:spPr>
+          <a:xfrm>
+            <a:off x="3105564" y="3491230"/>
+            <a:ext cx="365760" cy="365760"/>
+          </a:xfrm>
+          <a:prstGeom prst="ellipse">
+            <a:avLst/>
+          </a:prstGeom>
+          <a:noFill/>
+        </p:spPr>
+        <p:style>
+          <a:lnRef idx="2">
+            <a:schemeClr val="dk1">
+              <a:shade val="50000"/>
+            </a:schemeClr>
+          </a:lnRef>
+          <a:fillRef idx="1">
+            <a:schemeClr val="dk1"/>
+          </a:fillRef>
+          <a:effectRef idx="0">
+            <a:schemeClr val="dk1"/>
+          </a:effectRef>
+          <a:fontRef idx="minor">
+            <a:schemeClr val="lt1"/>
+          </a:fontRef>
+        </p:style>
+        <p:txBody>
+          <a:bodyPr rtlCol="0" anchor="ctr"/>
+          <a:lstStyle/>
+          <a:p>
+            <a:pPr algn="ctr"/>
+            <a:r>
+              <a:rPr lang="ar-EG" sz="1600" dirty="0">
+                <a:solidFill>
+                  <a:schemeClr val="tx1"/>
+                </a:solidFill>
+              </a:rPr>
+              <a:t>2</a:t>
+            </a:r>
+            <a:endParaRPr lang="en-US" sz="1600" dirty="0">
+              <a:solidFill>
+                <a:schemeClr val="tx1"/>
+              </a:solidFill>
+            </a:endParaRPr>
+          </a:p>
+        </p:txBody>
+      </p:sp>
+      <p:grpSp>
+        <p:nvGrpSpPr>
+          <p:cNvPr id="27" name="Group 26">
+            <a:extLst>
+              <a:ext uri="{FF2B5EF4-FFF2-40B4-BE49-F238E27FC236}">
+                <a16:creationId xmlns:a16="http://schemas.microsoft.com/office/drawing/2014/main" id="{F2F4ACD7-9F8F-F183-A6F1-487F898A250E}"/>
+              </a:ext>
+            </a:extLst>
+          </p:cNvPr>
+          <p:cNvGrpSpPr/>
+          <p:nvPr/>
+        </p:nvGrpSpPr>
+        <p:grpSpPr>
+          <a:xfrm>
+            <a:off x="3471324" y="3647040"/>
+            <a:ext cx="595455" cy="230832"/>
+            <a:chOff x="2678574" y="2010614"/>
+            <a:chExt cx="595455" cy="230832"/>
+          </a:xfrm>
+        </p:grpSpPr>
+        <p:cxnSp>
+          <p:nvCxnSpPr>
+            <p:cNvPr id="28" name="Straight Arrow Connector 27">
+              <a:extLst>
+                <a:ext uri="{FF2B5EF4-FFF2-40B4-BE49-F238E27FC236}">
+                  <a16:creationId xmlns:a16="http://schemas.microsoft.com/office/drawing/2014/main" id="{8E7225A5-0FBA-9723-8497-8E3D42490696}"/>
+                </a:ext>
+              </a:extLst>
+            </p:cNvPr>
+            <p:cNvCxnSpPr>
+              <a:cxnSpLocks/>
+              <a:stCxn id="26" idx="6"/>
+              <a:endCxn id="30" idx="2"/>
+            </p:cNvCxnSpPr>
+            <p:nvPr/>
+          </p:nvCxnSpPr>
+          <p:spPr>
+            <a:xfrm>
+              <a:off x="2678574" y="2037684"/>
+              <a:ext cx="595455" cy="0"/>
+            </a:xfrm>
+            <a:prstGeom prst="straightConnector1">
+              <a:avLst/>
+            </a:prstGeom>
+            <a:ln w="9525">
+              <a:tailEnd type="triangle"/>
+            </a:ln>
+          </p:spPr>
+          <p:style>
+            <a:lnRef idx="1">
+              <a:schemeClr val="dk1"/>
+            </a:lnRef>
+            <a:fillRef idx="0">
+              <a:schemeClr val="dk1"/>
+            </a:fillRef>
+            <a:effectRef idx="0">
+              <a:schemeClr val="dk1"/>
+            </a:effectRef>
+            <a:fontRef idx="minor">
+              <a:schemeClr val="tx1"/>
+            </a:fontRef>
+          </p:style>
+        </p:cxnSp>
+        <p:sp>
+          <p:nvSpPr>
+            <p:cNvPr id="29" name="TextBox 28">
+              <a:extLst>
+                <a:ext uri="{FF2B5EF4-FFF2-40B4-BE49-F238E27FC236}">
+                  <a16:creationId xmlns:a16="http://schemas.microsoft.com/office/drawing/2014/main" id="{226E12F4-FDCF-2F0A-D3BF-C35EEE1BF149}"/>
+                </a:ext>
+              </a:extLst>
+            </p:cNvPr>
+            <p:cNvSpPr txBox="1"/>
+            <p:nvPr/>
+          </p:nvSpPr>
+          <p:spPr>
+            <a:xfrm>
+              <a:off x="2842733" y="2010614"/>
+              <a:ext cx="150495" cy="230832"/>
+            </a:xfrm>
+            <a:prstGeom prst="rect">
+              <a:avLst/>
+            </a:prstGeom>
+            <a:noFill/>
+          </p:spPr>
+          <p:txBody>
+            <a:bodyPr wrap="square" rtlCol="0">
+              <a:spAutoFit/>
+            </a:bodyPr>
+            <a:lstStyle/>
+            <a:p>
+              <a:r>
+                <a:rPr lang="en-US" sz="900" b="1" dirty="0"/>
+                <a:t>t</a:t>
+              </a:r>
+            </a:p>
+          </p:txBody>
+        </p:sp>
+      </p:grpSp>
+      <p:sp>
+        <p:nvSpPr>
+          <p:cNvPr id="30" name="Oval 29">
+            <a:extLst>
+              <a:ext uri="{FF2B5EF4-FFF2-40B4-BE49-F238E27FC236}">
+                <a16:creationId xmlns:a16="http://schemas.microsoft.com/office/drawing/2014/main" id="{AD67B7B7-4A87-3BDE-4DB0-FD5D075063F8}"/>
+              </a:ext>
+            </a:extLst>
+          </p:cNvPr>
+          <p:cNvSpPr/>
+          <p:nvPr/>
+        </p:nvSpPr>
+        <p:spPr>
+          <a:xfrm>
+            <a:off x="4066779" y="3491230"/>
+            <a:ext cx="365760" cy="365760"/>
+          </a:xfrm>
+          <a:prstGeom prst="ellipse">
+            <a:avLst/>
+          </a:prstGeom>
+          <a:noFill/>
+        </p:spPr>
+        <p:style>
+          <a:lnRef idx="2">
+            <a:schemeClr val="dk1">
+              <a:shade val="50000"/>
+            </a:schemeClr>
+          </a:lnRef>
+          <a:fillRef idx="1">
+            <a:schemeClr val="dk1"/>
+          </a:fillRef>
+          <a:effectRef idx="0">
+            <a:schemeClr val="dk1"/>
+          </a:effectRef>
+          <a:fontRef idx="minor">
+            <a:schemeClr val="lt1"/>
+          </a:fontRef>
+        </p:style>
+        <p:txBody>
+          <a:bodyPr rtlCol="0" anchor="ctr"/>
+          <a:lstStyle/>
+          <a:p>
+            <a:pPr algn="ctr"/>
+            <a:r>
+              <a:rPr lang="ar-EG" sz="1600" dirty="0">
+                <a:solidFill>
+                  <a:schemeClr val="tx1"/>
+                </a:solidFill>
+              </a:rPr>
+              <a:t>3</a:t>
+            </a:r>
+            <a:endParaRPr lang="en-US" sz="1600" dirty="0">
+              <a:solidFill>
+                <a:schemeClr val="tx1"/>
+              </a:solidFill>
+            </a:endParaRPr>
+          </a:p>
+        </p:txBody>
+      </p:sp>
+      <p:grpSp>
+        <p:nvGrpSpPr>
+          <p:cNvPr id="31" name="Group 30">
+            <a:extLst>
+              <a:ext uri="{FF2B5EF4-FFF2-40B4-BE49-F238E27FC236}">
+                <a16:creationId xmlns:a16="http://schemas.microsoft.com/office/drawing/2014/main" id="{EBF07286-4BB7-52C0-7A46-37C3EE8EFB74}"/>
+              </a:ext>
+            </a:extLst>
+          </p:cNvPr>
+          <p:cNvGrpSpPr/>
+          <p:nvPr/>
+        </p:nvGrpSpPr>
+        <p:grpSpPr>
+          <a:xfrm>
+            <a:off x="4432539" y="3642615"/>
+            <a:ext cx="580966" cy="230832"/>
+            <a:chOff x="2689009" y="2010614"/>
+            <a:chExt cx="580966" cy="230832"/>
+          </a:xfrm>
+        </p:grpSpPr>
+        <p:cxnSp>
+          <p:nvCxnSpPr>
+            <p:cNvPr id="32" name="Straight Arrow Connector 31">
+              <a:extLst>
+                <a:ext uri="{FF2B5EF4-FFF2-40B4-BE49-F238E27FC236}">
+                  <a16:creationId xmlns:a16="http://schemas.microsoft.com/office/drawing/2014/main" id="{945DAAE3-AE39-FC0A-E6AB-6B1A6F798564}"/>
+                </a:ext>
+              </a:extLst>
+            </p:cNvPr>
+            <p:cNvCxnSpPr>
+              <a:cxnSpLocks/>
+              <a:stCxn id="30" idx="6"/>
+              <a:endCxn id="34" idx="2"/>
+            </p:cNvCxnSpPr>
+            <p:nvPr/>
+          </p:nvCxnSpPr>
+          <p:spPr>
+            <a:xfrm>
+              <a:off x="2689009" y="2042109"/>
+              <a:ext cx="580966" cy="0"/>
+            </a:xfrm>
+            <a:prstGeom prst="straightConnector1">
+              <a:avLst/>
+            </a:prstGeom>
+            <a:ln w="9525">
+              <a:tailEnd type="triangle"/>
+            </a:ln>
+          </p:spPr>
+          <p:style>
+            <a:lnRef idx="1">
+              <a:schemeClr val="dk1"/>
+            </a:lnRef>
+            <a:fillRef idx="0">
+              <a:schemeClr val="dk1"/>
+            </a:fillRef>
+            <a:effectRef idx="0">
+              <a:schemeClr val="dk1"/>
+            </a:effectRef>
+            <a:fontRef idx="minor">
+              <a:schemeClr val="tx1"/>
+            </a:fontRef>
+          </p:style>
+        </p:cxnSp>
+        <p:sp>
+          <p:nvSpPr>
+            <p:cNvPr id="33" name="TextBox 32">
+              <a:extLst>
+                <a:ext uri="{FF2B5EF4-FFF2-40B4-BE49-F238E27FC236}">
+                  <a16:creationId xmlns:a16="http://schemas.microsoft.com/office/drawing/2014/main" id="{A9D216C3-7E6B-B94E-8BC0-5FB6BC0AB64D}"/>
+                </a:ext>
+              </a:extLst>
+            </p:cNvPr>
+            <p:cNvSpPr txBox="1"/>
+            <p:nvPr/>
+          </p:nvSpPr>
+          <p:spPr>
+            <a:xfrm>
+              <a:off x="2842733" y="2010614"/>
+              <a:ext cx="150495" cy="230832"/>
+            </a:xfrm>
+            <a:prstGeom prst="rect">
+              <a:avLst/>
+            </a:prstGeom>
+            <a:noFill/>
+          </p:spPr>
+          <p:txBody>
+            <a:bodyPr wrap="square" rtlCol="0">
+              <a:spAutoFit/>
+            </a:bodyPr>
+            <a:lstStyle/>
+            <a:p>
+              <a:r>
+                <a:rPr lang="en-US" sz="900" b="1" dirty="0"/>
+                <a:t>e</a:t>
+              </a:r>
+            </a:p>
+          </p:txBody>
+        </p:sp>
+      </p:grpSp>
+      <p:sp>
+        <p:nvSpPr>
+          <p:cNvPr id="34" name="Oval 33">
+            <a:extLst>
+              <a:ext uri="{FF2B5EF4-FFF2-40B4-BE49-F238E27FC236}">
+                <a16:creationId xmlns:a16="http://schemas.microsoft.com/office/drawing/2014/main" id="{824AA061-60C8-37B4-E26D-730AF181D8AD}"/>
+              </a:ext>
+            </a:extLst>
+          </p:cNvPr>
+          <p:cNvSpPr/>
+          <p:nvPr/>
+        </p:nvSpPr>
+        <p:spPr>
+          <a:xfrm>
+            <a:off x="5013505" y="3491230"/>
+            <a:ext cx="365760" cy="365760"/>
+          </a:xfrm>
+          <a:prstGeom prst="ellipse">
+            <a:avLst/>
+          </a:prstGeom>
+          <a:noFill/>
+        </p:spPr>
+        <p:style>
+          <a:lnRef idx="2">
+            <a:schemeClr val="dk1">
+              <a:shade val="50000"/>
+            </a:schemeClr>
+          </a:lnRef>
+          <a:fillRef idx="1">
+            <a:schemeClr val="dk1"/>
+          </a:fillRef>
+          <a:effectRef idx="0">
+            <a:schemeClr val="dk1"/>
+          </a:effectRef>
+          <a:fontRef idx="minor">
+            <a:schemeClr val="lt1"/>
+          </a:fontRef>
+        </p:style>
+        <p:txBody>
+          <a:bodyPr rtlCol="0" anchor="ctr"/>
+          <a:lstStyle/>
+          <a:p>
+            <a:pPr algn="ctr"/>
+            <a:r>
+              <a:rPr lang="ar-EG" sz="1600" dirty="0">
+                <a:solidFill>
+                  <a:schemeClr val="tx1"/>
+                </a:solidFill>
+              </a:rPr>
+              <a:t>4</a:t>
+            </a:r>
+            <a:endParaRPr lang="en-US" sz="1600" dirty="0">
+              <a:solidFill>
+                <a:schemeClr val="tx1"/>
+              </a:solidFill>
+            </a:endParaRPr>
+          </a:p>
+        </p:txBody>
+      </p:sp>
+      <p:grpSp>
+        <p:nvGrpSpPr>
+          <p:cNvPr id="35" name="Group 34">
+            <a:extLst>
+              <a:ext uri="{FF2B5EF4-FFF2-40B4-BE49-F238E27FC236}">
+                <a16:creationId xmlns:a16="http://schemas.microsoft.com/office/drawing/2014/main" id="{6A3929DE-FCF4-EC47-0DC5-DB7A6247344C}"/>
+              </a:ext>
+            </a:extLst>
+          </p:cNvPr>
+          <p:cNvGrpSpPr/>
+          <p:nvPr/>
+        </p:nvGrpSpPr>
+        <p:grpSpPr>
+          <a:xfrm>
+            <a:off x="5379265" y="3642068"/>
+            <a:ext cx="633853" cy="230832"/>
+            <a:chOff x="2670505" y="2010614"/>
+            <a:chExt cx="633853" cy="230832"/>
+          </a:xfrm>
+        </p:grpSpPr>
+        <p:cxnSp>
+          <p:nvCxnSpPr>
+            <p:cNvPr id="36" name="Straight Arrow Connector 35">
+              <a:extLst>
+                <a:ext uri="{FF2B5EF4-FFF2-40B4-BE49-F238E27FC236}">
+                  <a16:creationId xmlns:a16="http://schemas.microsoft.com/office/drawing/2014/main" id="{8567F645-9864-6675-634C-ED8513FFC707}"/>
+                </a:ext>
+              </a:extLst>
+            </p:cNvPr>
+            <p:cNvCxnSpPr>
+              <a:cxnSpLocks/>
+              <a:stCxn id="34" idx="6"/>
+              <a:endCxn id="38" idx="2"/>
+            </p:cNvCxnSpPr>
+            <p:nvPr/>
+          </p:nvCxnSpPr>
+          <p:spPr>
+            <a:xfrm>
+              <a:off x="2670505" y="2042656"/>
+              <a:ext cx="633853" cy="0"/>
+            </a:xfrm>
+            <a:prstGeom prst="straightConnector1">
+              <a:avLst/>
+            </a:prstGeom>
+            <a:ln w="9525">
+              <a:tailEnd type="triangle"/>
+            </a:ln>
+          </p:spPr>
+          <p:style>
+            <a:lnRef idx="1">
+              <a:schemeClr val="dk1"/>
+            </a:lnRef>
+            <a:fillRef idx="0">
+              <a:schemeClr val="dk1"/>
+            </a:fillRef>
+            <a:effectRef idx="0">
+              <a:schemeClr val="dk1"/>
+            </a:effectRef>
+            <a:fontRef idx="minor">
+              <a:schemeClr val="tx1"/>
+            </a:fontRef>
+          </p:style>
+        </p:cxnSp>
+        <p:sp>
+          <p:nvSpPr>
+            <p:cNvPr id="37" name="TextBox 36">
+              <a:extLst>
+                <a:ext uri="{FF2B5EF4-FFF2-40B4-BE49-F238E27FC236}">
+                  <a16:creationId xmlns:a16="http://schemas.microsoft.com/office/drawing/2014/main" id="{7AF2D598-5D52-984F-D053-5987E98B87C8}"/>
+                </a:ext>
+              </a:extLst>
+            </p:cNvPr>
+            <p:cNvSpPr txBox="1"/>
+            <p:nvPr/>
+          </p:nvSpPr>
+          <p:spPr>
+            <a:xfrm>
+              <a:off x="2842733" y="2010614"/>
+              <a:ext cx="150495" cy="230832"/>
+            </a:xfrm>
+            <a:prstGeom prst="rect">
+              <a:avLst/>
+            </a:prstGeom>
+            <a:noFill/>
+          </p:spPr>
+          <p:txBody>
+            <a:bodyPr wrap="square" rtlCol="0">
+              <a:spAutoFit/>
+            </a:bodyPr>
+            <a:lstStyle/>
+            <a:p>
+              <a:r>
+                <a:rPr lang="en-US" sz="900" b="1" dirty="0"/>
+                <a:t>g</a:t>
+              </a:r>
+            </a:p>
+          </p:txBody>
+        </p:sp>
+      </p:grpSp>
+      <p:sp>
+        <p:nvSpPr>
+          <p:cNvPr id="38" name="Oval 37">
+            <a:extLst>
+              <a:ext uri="{FF2B5EF4-FFF2-40B4-BE49-F238E27FC236}">
+                <a16:creationId xmlns:a16="http://schemas.microsoft.com/office/drawing/2014/main" id="{CE0D462C-ED8D-3DAE-8A37-6D76701A3A72}"/>
+              </a:ext>
+            </a:extLst>
+          </p:cNvPr>
+          <p:cNvSpPr/>
+          <p:nvPr/>
+        </p:nvSpPr>
+        <p:spPr>
+          <a:xfrm>
+            <a:off x="6013118" y="3491230"/>
+            <a:ext cx="365760" cy="365760"/>
+          </a:xfrm>
+          <a:prstGeom prst="ellipse">
+            <a:avLst/>
+          </a:prstGeom>
+          <a:noFill/>
+        </p:spPr>
+        <p:style>
+          <a:lnRef idx="2">
+            <a:schemeClr val="dk1">
+              <a:shade val="50000"/>
+            </a:schemeClr>
+          </a:lnRef>
+          <a:fillRef idx="1">
+            <a:schemeClr val="dk1"/>
+          </a:fillRef>
+          <a:effectRef idx="0">
+            <a:schemeClr val="dk1"/>
+          </a:effectRef>
+          <a:fontRef idx="minor">
+            <a:schemeClr val="lt1"/>
+          </a:fontRef>
+        </p:style>
+        <p:txBody>
+          <a:bodyPr rtlCol="0" anchor="ctr"/>
+          <a:lstStyle/>
+          <a:p>
+            <a:pPr algn="ctr"/>
+            <a:r>
+              <a:rPr lang="ar-EG" sz="1600" dirty="0">
+                <a:solidFill>
+                  <a:schemeClr val="tx1"/>
+                </a:solidFill>
+              </a:rPr>
+              <a:t>5</a:t>
+            </a:r>
+            <a:endParaRPr lang="en-US" sz="1600" dirty="0">
+              <a:solidFill>
+                <a:schemeClr val="tx1"/>
+              </a:solidFill>
+            </a:endParaRPr>
+          </a:p>
+        </p:txBody>
+      </p:sp>
+      <p:grpSp>
+        <p:nvGrpSpPr>
+          <p:cNvPr id="39" name="Group 38">
+            <a:extLst>
+              <a:ext uri="{FF2B5EF4-FFF2-40B4-BE49-F238E27FC236}">
+                <a16:creationId xmlns:a16="http://schemas.microsoft.com/office/drawing/2014/main" id="{E7AA623E-3191-9B8A-CDD7-576D88F8D3D2}"/>
+              </a:ext>
+            </a:extLst>
+          </p:cNvPr>
+          <p:cNvGrpSpPr/>
+          <p:nvPr/>
+        </p:nvGrpSpPr>
+        <p:grpSpPr>
+          <a:xfrm>
+            <a:off x="6378878" y="3654629"/>
+            <a:ext cx="651982" cy="230832"/>
+            <a:chOff x="2635248" y="2010614"/>
+            <a:chExt cx="651982" cy="230832"/>
+          </a:xfrm>
+        </p:grpSpPr>
+        <p:cxnSp>
+          <p:nvCxnSpPr>
+            <p:cNvPr id="40" name="Straight Arrow Connector 39">
+              <a:extLst>
+                <a:ext uri="{FF2B5EF4-FFF2-40B4-BE49-F238E27FC236}">
+                  <a16:creationId xmlns:a16="http://schemas.microsoft.com/office/drawing/2014/main" id="{E7B66DF5-F45E-785D-57F7-5BB104E54837}"/>
+                </a:ext>
+              </a:extLst>
+            </p:cNvPr>
+            <p:cNvCxnSpPr>
+              <a:cxnSpLocks/>
+              <a:stCxn id="38" idx="6"/>
+              <a:endCxn id="42" idx="2"/>
+            </p:cNvCxnSpPr>
+            <p:nvPr/>
+          </p:nvCxnSpPr>
+          <p:spPr>
+            <a:xfrm>
+              <a:off x="2635248" y="2030095"/>
+              <a:ext cx="651982" cy="0"/>
+            </a:xfrm>
+            <a:prstGeom prst="straightConnector1">
+              <a:avLst/>
+            </a:prstGeom>
+            <a:ln w="9525">
+              <a:tailEnd type="triangle"/>
+            </a:ln>
+          </p:spPr>
+          <p:style>
+            <a:lnRef idx="1">
+              <a:schemeClr val="dk1"/>
+            </a:lnRef>
+            <a:fillRef idx="0">
+              <a:schemeClr val="dk1"/>
+            </a:fillRef>
+            <a:effectRef idx="0">
+              <a:schemeClr val="dk1"/>
+            </a:effectRef>
+            <a:fontRef idx="minor">
+              <a:schemeClr val="tx1"/>
+            </a:fontRef>
+          </p:style>
+        </p:cxnSp>
+        <p:sp>
+          <p:nvSpPr>
+            <p:cNvPr id="41" name="TextBox 40">
+              <a:extLst>
+                <a:ext uri="{FF2B5EF4-FFF2-40B4-BE49-F238E27FC236}">
+                  <a16:creationId xmlns:a16="http://schemas.microsoft.com/office/drawing/2014/main" id="{75DF1CAF-E09A-4261-4549-9273C255729C}"/>
+                </a:ext>
+              </a:extLst>
+            </p:cNvPr>
+            <p:cNvSpPr txBox="1"/>
+            <p:nvPr/>
+          </p:nvSpPr>
+          <p:spPr>
+            <a:xfrm>
+              <a:off x="2842733" y="2010614"/>
+              <a:ext cx="150495" cy="230832"/>
+            </a:xfrm>
+            <a:prstGeom prst="rect">
+              <a:avLst/>
+            </a:prstGeom>
+            <a:noFill/>
+          </p:spPr>
+          <p:txBody>
+            <a:bodyPr wrap="square" rtlCol="0">
+              <a:spAutoFit/>
+            </a:bodyPr>
+            <a:lstStyle/>
+            <a:p>
+              <a:r>
+                <a:rPr lang="en-US" sz="900" b="1" dirty="0"/>
+                <a:t>o</a:t>
+              </a:r>
+            </a:p>
+          </p:txBody>
+        </p:sp>
+      </p:grpSp>
+      <p:sp>
+        <p:nvSpPr>
+          <p:cNvPr id="42" name="Oval 41">
+            <a:extLst>
+              <a:ext uri="{FF2B5EF4-FFF2-40B4-BE49-F238E27FC236}">
+                <a16:creationId xmlns:a16="http://schemas.microsoft.com/office/drawing/2014/main" id="{C136916D-89DA-8B99-8FC8-8CB7ED5EE3BC}"/>
+              </a:ext>
+            </a:extLst>
+          </p:cNvPr>
+          <p:cNvSpPr/>
+          <p:nvPr/>
+        </p:nvSpPr>
+        <p:spPr>
+          <a:xfrm>
+            <a:off x="7030860" y="3491230"/>
+            <a:ext cx="365760" cy="365760"/>
+          </a:xfrm>
+          <a:prstGeom prst="ellipse">
+            <a:avLst/>
+          </a:prstGeom>
+          <a:noFill/>
+        </p:spPr>
+        <p:style>
+          <a:lnRef idx="2">
+            <a:schemeClr val="dk1">
+              <a:shade val="50000"/>
+            </a:schemeClr>
+          </a:lnRef>
+          <a:fillRef idx="1">
+            <a:schemeClr val="dk1"/>
+          </a:fillRef>
+          <a:effectRef idx="0">
+            <a:schemeClr val="dk1"/>
+          </a:effectRef>
+          <a:fontRef idx="minor">
+            <a:schemeClr val="lt1"/>
+          </a:fontRef>
+        </p:style>
+        <p:txBody>
+          <a:bodyPr rtlCol="0" anchor="ctr"/>
+          <a:lstStyle/>
+          <a:p>
+            <a:pPr algn="ctr"/>
+            <a:r>
+              <a:rPr lang="ar-EG" sz="1600" dirty="0">
+                <a:solidFill>
+                  <a:schemeClr val="tx1"/>
+                </a:solidFill>
+              </a:rPr>
+              <a:t>6</a:t>
+            </a:r>
+            <a:endParaRPr lang="en-US" sz="1600" dirty="0">
+              <a:solidFill>
+                <a:schemeClr val="tx1"/>
+              </a:solidFill>
+            </a:endParaRPr>
+          </a:p>
+        </p:txBody>
+      </p:sp>
+      <p:grpSp>
+        <p:nvGrpSpPr>
+          <p:cNvPr id="43" name="Group 42">
+            <a:extLst>
+              <a:ext uri="{FF2B5EF4-FFF2-40B4-BE49-F238E27FC236}">
+                <a16:creationId xmlns:a16="http://schemas.microsoft.com/office/drawing/2014/main" id="{7A4F762C-3BE0-14E5-7DD9-D0D06428513D}"/>
+              </a:ext>
+            </a:extLst>
+          </p:cNvPr>
+          <p:cNvGrpSpPr/>
+          <p:nvPr/>
+        </p:nvGrpSpPr>
+        <p:grpSpPr>
+          <a:xfrm>
+            <a:off x="7396620" y="3669030"/>
+            <a:ext cx="679599" cy="237734"/>
+            <a:chOff x="2653072" y="2003712"/>
+            <a:chExt cx="679599" cy="237734"/>
+          </a:xfrm>
+        </p:grpSpPr>
+        <p:cxnSp>
+          <p:nvCxnSpPr>
+            <p:cNvPr id="44" name="Straight Arrow Connector 43">
+              <a:extLst>
+                <a:ext uri="{FF2B5EF4-FFF2-40B4-BE49-F238E27FC236}">
+                  <a16:creationId xmlns:a16="http://schemas.microsoft.com/office/drawing/2014/main" id="{5FADB65D-7F21-23AF-0F0F-634FCE30D5B4}"/>
+                </a:ext>
+              </a:extLst>
+            </p:cNvPr>
+            <p:cNvCxnSpPr>
+              <a:cxnSpLocks/>
+              <a:stCxn id="42" idx="6"/>
+              <a:endCxn id="46" idx="2"/>
+            </p:cNvCxnSpPr>
+            <p:nvPr/>
+          </p:nvCxnSpPr>
+          <p:spPr>
+            <a:xfrm flipV="1">
+              <a:off x="2653072" y="2003712"/>
+              <a:ext cx="679599" cy="5080"/>
+            </a:xfrm>
+            <a:prstGeom prst="straightConnector1">
+              <a:avLst/>
+            </a:prstGeom>
+            <a:ln w="9525">
+              <a:tailEnd type="triangle"/>
+            </a:ln>
+          </p:spPr>
+          <p:style>
+            <a:lnRef idx="1">
+              <a:schemeClr val="dk1"/>
+            </a:lnRef>
+            <a:fillRef idx="0">
+              <a:schemeClr val="dk1"/>
+            </a:fillRef>
+            <a:effectRef idx="0">
+              <a:schemeClr val="dk1"/>
+            </a:effectRef>
+            <a:fontRef idx="minor">
+              <a:schemeClr val="tx1"/>
+            </a:fontRef>
+          </p:style>
+        </p:cxnSp>
+        <p:sp>
+          <p:nvSpPr>
+            <p:cNvPr id="45" name="TextBox 44">
+              <a:extLst>
+                <a:ext uri="{FF2B5EF4-FFF2-40B4-BE49-F238E27FC236}">
+                  <a16:creationId xmlns:a16="http://schemas.microsoft.com/office/drawing/2014/main" id="{27B0EE0E-1EDB-0C49-FD1A-1A366524CB35}"/>
+                </a:ext>
+              </a:extLst>
+            </p:cNvPr>
+            <p:cNvSpPr txBox="1"/>
+            <p:nvPr/>
+          </p:nvSpPr>
+          <p:spPr>
+            <a:xfrm>
+              <a:off x="2842733" y="2010614"/>
+              <a:ext cx="150495" cy="230832"/>
+            </a:xfrm>
+            <a:prstGeom prst="rect">
+              <a:avLst/>
+            </a:prstGeom>
+            <a:noFill/>
+          </p:spPr>
+          <p:txBody>
+            <a:bodyPr wrap="square" rtlCol="0">
+              <a:spAutoFit/>
+            </a:bodyPr>
+            <a:lstStyle/>
+            <a:p>
+              <a:r>
+                <a:rPr lang="en-US" sz="900" b="1" dirty="0"/>
+                <a:t>r</a:t>
+              </a:r>
+            </a:p>
+          </p:txBody>
+        </p:sp>
+      </p:grpSp>
+      <p:sp>
+        <p:nvSpPr>
+          <p:cNvPr id="46" name="Oval 45">
+            <a:extLst>
+              <a:ext uri="{FF2B5EF4-FFF2-40B4-BE49-F238E27FC236}">
+                <a16:creationId xmlns:a16="http://schemas.microsoft.com/office/drawing/2014/main" id="{2FCDC03C-7C38-80A0-AB7F-295DF116EF39}"/>
+              </a:ext>
+            </a:extLst>
+          </p:cNvPr>
+          <p:cNvSpPr/>
+          <p:nvPr/>
+        </p:nvSpPr>
+        <p:spPr>
+          <a:xfrm>
+            <a:off x="8076219" y="3486150"/>
+            <a:ext cx="365760" cy="365760"/>
+          </a:xfrm>
+          <a:prstGeom prst="ellipse">
+            <a:avLst/>
+          </a:prstGeom>
+          <a:noFill/>
+        </p:spPr>
+        <p:style>
+          <a:lnRef idx="2">
+            <a:schemeClr val="dk1">
+              <a:shade val="50000"/>
+            </a:schemeClr>
+          </a:lnRef>
+          <a:fillRef idx="1">
+            <a:schemeClr val="dk1"/>
+          </a:fillRef>
+          <a:effectRef idx="0">
+            <a:schemeClr val="dk1"/>
+          </a:effectRef>
+          <a:fontRef idx="minor">
+            <a:schemeClr val="lt1"/>
+          </a:fontRef>
+        </p:style>
+        <p:txBody>
+          <a:bodyPr rtlCol="0" anchor="ctr"/>
+          <a:lstStyle/>
+          <a:p>
+            <a:pPr algn="ctr"/>
+            <a:r>
+              <a:rPr lang="ar-EG" sz="1600" dirty="0">
+                <a:solidFill>
+                  <a:schemeClr val="tx1"/>
+                </a:solidFill>
+              </a:rPr>
+              <a:t>7</a:t>
+            </a:r>
+            <a:endParaRPr lang="en-US" sz="1600" dirty="0">
+              <a:solidFill>
+                <a:schemeClr val="tx1"/>
+              </a:solidFill>
+            </a:endParaRPr>
+          </a:p>
+        </p:txBody>
+      </p:sp>
+      <p:grpSp>
+        <p:nvGrpSpPr>
+          <p:cNvPr id="47" name="Group 46">
+            <a:extLst>
+              <a:ext uri="{FF2B5EF4-FFF2-40B4-BE49-F238E27FC236}">
+                <a16:creationId xmlns:a16="http://schemas.microsoft.com/office/drawing/2014/main" id="{A4C62E59-7DAD-462A-2033-897738C4DD9B}"/>
+              </a:ext>
+            </a:extLst>
+          </p:cNvPr>
+          <p:cNvGrpSpPr/>
+          <p:nvPr/>
+        </p:nvGrpSpPr>
+        <p:grpSpPr>
+          <a:xfrm>
+            <a:off x="8441979" y="3669030"/>
+            <a:ext cx="687815" cy="237712"/>
+            <a:chOff x="2582026" y="2003734"/>
+            <a:chExt cx="687815" cy="237712"/>
+          </a:xfrm>
+        </p:grpSpPr>
+        <p:cxnSp>
+          <p:nvCxnSpPr>
+            <p:cNvPr id="48" name="Straight Arrow Connector 47">
+              <a:extLst>
+                <a:ext uri="{FF2B5EF4-FFF2-40B4-BE49-F238E27FC236}">
+                  <a16:creationId xmlns:a16="http://schemas.microsoft.com/office/drawing/2014/main" id="{5154909D-09A6-B41F-9C3E-3B70C1DD4E84}"/>
+                </a:ext>
+              </a:extLst>
+            </p:cNvPr>
+            <p:cNvCxnSpPr>
+              <a:cxnSpLocks/>
+              <a:stCxn id="46" idx="6"/>
+              <a:endCxn id="12" idx="2"/>
+            </p:cNvCxnSpPr>
+            <p:nvPr/>
+          </p:nvCxnSpPr>
+          <p:spPr>
+            <a:xfrm>
+              <a:off x="2582026" y="2003734"/>
+              <a:ext cx="687815" cy="0"/>
+            </a:xfrm>
+            <a:prstGeom prst="straightConnector1">
+              <a:avLst/>
+            </a:prstGeom>
+            <a:ln w="9525">
+              <a:tailEnd type="triangle"/>
+            </a:ln>
+          </p:spPr>
+          <p:style>
+            <a:lnRef idx="1">
+              <a:schemeClr val="dk1"/>
+            </a:lnRef>
+            <a:fillRef idx="0">
+              <a:schemeClr val="dk1"/>
+            </a:fillRef>
+            <a:effectRef idx="0">
+              <a:schemeClr val="dk1"/>
+            </a:effectRef>
+            <a:fontRef idx="minor">
+              <a:schemeClr val="tx1"/>
+            </a:fontRef>
+          </p:style>
+        </p:cxnSp>
+        <p:sp>
+          <p:nvSpPr>
+            <p:cNvPr id="49" name="TextBox 48">
+              <a:extLst>
+                <a:ext uri="{FF2B5EF4-FFF2-40B4-BE49-F238E27FC236}">
+                  <a16:creationId xmlns:a16="http://schemas.microsoft.com/office/drawing/2014/main" id="{A9EA8771-50E7-25CA-0FA2-54582E97B4E7}"/>
+                </a:ext>
+              </a:extLst>
+            </p:cNvPr>
+            <p:cNvSpPr txBox="1"/>
+            <p:nvPr/>
+          </p:nvSpPr>
+          <p:spPr>
+            <a:xfrm>
+              <a:off x="2842733" y="2010614"/>
+              <a:ext cx="150495" cy="230832"/>
+            </a:xfrm>
+            <a:prstGeom prst="rect">
+              <a:avLst/>
+            </a:prstGeom>
+            <a:noFill/>
+          </p:spPr>
+          <p:txBody>
+            <a:bodyPr wrap="square" rtlCol="0">
+              <a:spAutoFit/>
+            </a:bodyPr>
+            <a:lstStyle/>
+            <a:p>
+              <a:r>
+                <a:rPr lang="en-US" sz="900" b="1" dirty="0"/>
+                <a:t>y</a:t>
+              </a:r>
+            </a:p>
+          </p:txBody>
+        </p:sp>
+      </p:grpSp>
+      <p:grpSp>
+        <p:nvGrpSpPr>
+          <p:cNvPr id="88" name="Group 87">
+            <a:extLst>
+              <a:ext uri="{FF2B5EF4-FFF2-40B4-BE49-F238E27FC236}">
+                <a16:creationId xmlns:a16="http://schemas.microsoft.com/office/drawing/2014/main" id="{C0D41BE8-1971-2E8E-62B9-D15520124405}"/>
+              </a:ext>
+            </a:extLst>
+          </p:cNvPr>
+          <p:cNvGrpSpPr/>
+          <p:nvPr/>
+        </p:nvGrpSpPr>
+        <p:grpSpPr>
+          <a:xfrm>
+            <a:off x="627917" y="908092"/>
+            <a:ext cx="1268794" cy="365760"/>
+            <a:chOff x="627917" y="908092"/>
+            <a:chExt cx="1268794" cy="365760"/>
+          </a:xfrm>
+        </p:grpSpPr>
+        <p:sp>
+          <p:nvSpPr>
+            <p:cNvPr id="89" name="TextBox 88">
+              <a:extLst>
+                <a:ext uri="{FF2B5EF4-FFF2-40B4-BE49-F238E27FC236}">
+                  <a16:creationId xmlns:a16="http://schemas.microsoft.com/office/drawing/2014/main" id="{C41F2B83-E78A-EF8A-B6FF-61C2E0CFF3D2}"/>
+                </a:ext>
+              </a:extLst>
+            </p:cNvPr>
+            <p:cNvSpPr txBox="1"/>
+            <p:nvPr/>
+          </p:nvSpPr>
+          <p:spPr>
+            <a:xfrm>
+              <a:off x="627917" y="952473"/>
+              <a:ext cx="488413" cy="276999"/>
+            </a:xfrm>
+            <a:prstGeom prst="rect">
+              <a:avLst/>
+            </a:prstGeom>
+            <a:noFill/>
+          </p:spPr>
+          <p:txBody>
+            <a:bodyPr wrap="square" rtlCol="0">
+              <a:spAutoFit/>
+            </a:bodyPr>
+            <a:lstStyle/>
+            <a:p>
+              <a:r>
+                <a:rPr lang="en-US" sz="1200" dirty="0"/>
+                <a:t>Start</a:t>
+              </a:r>
+            </a:p>
+          </p:txBody>
+        </p:sp>
+        <p:cxnSp>
+          <p:nvCxnSpPr>
+            <p:cNvPr id="90" name="Straight Arrow Connector 89">
+              <a:extLst>
+                <a:ext uri="{FF2B5EF4-FFF2-40B4-BE49-F238E27FC236}">
+                  <a16:creationId xmlns:a16="http://schemas.microsoft.com/office/drawing/2014/main" id="{8054E8F4-0705-1481-A0D0-C76F8D10AA4A}"/>
+                </a:ext>
+              </a:extLst>
+            </p:cNvPr>
+            <p:cNvCxnSpPr>
+              <a:cxnSpLocks/>
+              <a:stCxn id="89" idx="3"/>
+              <a:endCxn id="91" idx="2"/>
+            </p:cNvCxnSpPr>
+            <p:nvPr/>
+          </p:nvCxnSpPr>
+          <p:spPr>
+            <a:xfrm flipV="1">
+              <a:off x="1116330" y="1090972"/>
+              <a:ext cx="414621" cy="1"/>
+            </a:xfrm>
+            <a:prstGeom prst="straightConnector1">
+              <a:avLst/>
+            </a:prstGeom>
+            <a:ln w="9525">
+              <a:tailEnd type="triangle"/>
+            </a:ln>
+          </p:spPr>
+          <p:style>
+            <a:lnRef idx="1">
+              <a:schemeClr val="dk1"/>
+            </a:lnRef>
+            <a:fillRef idx="0">
+              <a:schemeClr val="dk1"/>
+            </a:fillRef>
+            <a:effectRef idx="0">
+              <a:schemeClr val="dk1"/>
+            </a:effectRef>
+            <a:fontRef idx="minor">
+              <a:schemeClr val="tx1"/>
+            </a:fontRef>
+          </p:style>
+        </p:cxnSp>
+        <p:sp>
+          <p:nvSpPr>
+            <p:cNvPr id="91" name="Oval 90">
+              <a:extLst>
+                <a:ext uri="{FF2B5EF4-FFF2-40B4-BE49-F238E27FC236}">
+                  <a16:creationId xmlns:a16="http://schemas.microsoft.com/office/drawing/2014/main" id="{ABC0A074-553F-D830-0E90-C896EB73A490}"/>
+                </a:ext>
+              </a:extLst>
+            </p:cNvPr>
+            <p:cNvSpPr/>
+            <p:nvPr/>
+          </p:nvSpPr>
+          <p:spPr>
+            <a:xfrm>
+              <a:off x="1530951" y="908092"/>
+              <a:ext cx="365760" cy="365760"/>
+            </a:xfrm>
+            <a:prstGeom prst="ellipse">
+              <a:avLst/>
+            </a:prstGeom>
+            <a:noFill/>
+          </p:spPr>
+          <p:style>
+            <a:lnRef idx="2">
+              <a:schemeClr val="dk1">
+                <a:shade val="50000"/>
+              </a:schemeClr>
+            </a:lnRef>
+            <a:fillRef idx="1">
+              <a:schemeClr val="dk1"/>
+            </a:fillRef>
+            <a:effectRef idx="0">
+              <a:schemeClr val="dk1"/>
+            </a:effectRef>
+            <a:fontRef idx="minor">
+              <a:schemeClr val="lt1"/>
+            </a:fontRef>
+          </p:style>
+          <p:txBody>
+            <a:bodyPr rtlCol="0" anchor="ctr"/>
+            <a:lstStyle/>
+            <a:p>
+              <a:pPr algn="ctr"/>
+              <a:r>
+                <a:rPr lang="en-US" sz="1600" dirty="0">
+                  <a:solidFill>
+                    <a:schemeClr val="tx1"/>
+                  </a:solidFill>
+                </a:rPr>
+                <a:t>0</a:t>
+              </a:r>
+            </a:p>
+          </p:txBody>
+        </p:sp>
+      </p:grpSp>
+      <p:sp>
+        <p:nvSpPr>
+          <p:cNvPr id="92" name="Oval 91">
+            <a:extLst>
+              <a:ext uri="{FF2B5EF4-FFF2-40B4-BE49-F238E27FC236}">
+                <a16:creationId xmlns:a16="http://schemas.microsoft.com/office/drawing/2014/main" id="{D395BEA7-0C79-D382-864F-7946C896DDD1}"/>
               </a:ext>
             </a:extLst>
           </p:cNvPr>
@@ -3566,10 +4953,10 @@
       </p:sp>
       <p:grpSp>
         <p:nvGrpSpPr>
-          <p:cNvPr id="10" name="Group 9">
-            <a:extLst>
-              <a:ext uri="{FF2B5EF4-FFF2-40B4-BE49-F238E27FC236}">
-                <a16:creationId xmlns:a16="http://schemas.microsoft.com/office/drawing/2014/main" id="{AE3EDFEA-9327-69B8-1CF2-05DFF56FA0C0}"/>
+          <p:cNvPr id="93" name="Group 92">
+            <a:extLst>
+              <a:ext uri="{FF2B5EF4-FFF2-40B4-BE49-F238E27FC236}">
+                <a16:creationId xmlns:a16="http://schemas.microsoft.com/office/drawing/2014/main" id="{9885FAB7-A4BC-EDA2-ADFC-E25AAACC5F94}"/>
               </a:ext>
             </a:extLst>
           </p:cNvPr>
@@ -3586,10 +4973,10 @@
         </p:grpSpPr>
         <p:cxnSp>
           <p:nvCxnSpPr>
-            <p:cNvPr id="21" name="Straight Arrow Connector 20">
+            <p:cNvPr id="94" name="Straight Arrow Connector 93">
               <a:extLst>
                 <a:ext uri="{FF2B5EF4-FFF2-40B4-BE49-F238E27FC236}">
-                  <a16:creationId xmlns:a16="http://schemas.microsoft.com/office/drawing/2014/main" id="{336BEF5D-1419-242D-E289-1C289383C441}"/>
+                  <a16:creationId xmlns:a16="http://schemas.microsoft.com/office/drawing/2014/main" id="{B1EB492B-8708-9BCA-3E05-694E01483E3D}"/>
                 </a:ext>
               </a:extLst>
             </p:cNvPr>
@@ -3627,10 +5014,10 @@
         </p:cxnSp>
         <p:sp>
           <p:nvSpPr>
-            <p:cNvPr id="24" name="TextBox 23">
+            <p:cNvPr id="95" name="TextBox 94">
               <a:extLst>
                 <a:ext uri="{FF2B5EF4-FFF2-40B4-BE49-F238E27FC236}">
-                  <a16:creationId xmlns:a16="http://schemas.microsoft.com/office/drawing/2014/main" id="{97456F65-DFCA-CAAC-E9E3-913578CD8052}"/>
+                  <a16:creationId xmlns:a16="http://schemas.microsoft.com/office/drawing/2014/main" id="{A0E2E61F-5F81-6340-33B5-C94D2CD12D6E}"/>
                 </a:ext>
               </a:extLst>
             </p:cNvPr>
@@ -3663,10 +5050,10 @@
       </p:grpSp>
       <p:sp>
         <p:nvSpPr>
-          <p:cNvPr id="28" name="Oval 27">
-            <a:extLst>
-              <a:ext uri="{FF2B5EF4-FFF2-40B4-BE49-F238E27FC236}">
-                <a16:creationId xmlns:a16="http://schemas.microsoft.com/office/drawing/2014/main" id="{4B97BBBB-EE05-502C-7F65-1B3B0CC2B639}"/>
+          <p:cNvPr id="96" name="Oval 95">
+            <a:extLst>
+              <a:ext uri="{FF2B5EF4-FFF2-40B4-BE49-F238E27FC236}">
+                <a16:creationId xmlns:a16="http://schemas.microsoft.com/office/drawing/2014/main" id="{056127A4-C4E2-8B52-2AB0-41FA6A6334B7}"/>
               </a:ext>
             </a:extLst>
           </p:cNvPr>
@@ -3718,10 +5105,10 @@
       </p:sp>
       <p:grpSp>
         <p:nvGrpSpPr>
-          <p:cNvPr id="57" name="Group 56">
-            <a:extLst>
-              <a:ext uri="{FF2B5EF4-FFF2-40B4-BE49-F238E27FC236}">
-                <a16:creationId xmlns:a16="http://schemas.microsoft.com/office/drawing/2014/main" id="{EB1F6FC2-2170-45C8-EFDD-DBB631AB5AEE}"/>
+          <p:cNvPr id="97" name="Group 96">
+            <a:extLst>
+              <a:ext uri="{FF2B5EF4-FFF2-40B4-BE49-F238E27FC236}">
+                <a16:creationId xmlns:a16="http://schemas.microsoft.com/office/drawing/2014/main" id="{E34CBCFC-BBBF-7D55-05F8-60A8A0E6867C}"/>
               </a:ext>
             </a:extLst>
           </p:cNvPr>
@@ -3738,10 +5125,10 @@
         </p:grpSpPr>
         <p:sp>
           <p:nvSpPr>
-            <p:cNvPr id="50" name="Oval 49">
+            <p:cNvPr id="98" name="Oval 97">
               <a:extLst>
                 <a:ext uri="{FF2B5EF4-FFF2-40B4-BE49-F238E27FC236}">
-                  <a16:creationId xmlns:a16="http://schemas.microsoft.com/office/drawing/2014/main" id="{AE38CCAE-AE0A-B5C5-8200-3D5406E333E2}"/>
+                  <a16:creationId xmlns:a16="http://schemas.microsoft.com/office/drawing/2014/main" id="{4A957AA2-14A5-B5E4-E8C4-7717D4E86344}"/>
                 </a:ext>
               </a:extLst>
             </p:cNvPr>
@@ -3792,10 +5179,10 @@
         </p:sp>
         <p:grpSp>
           <p:nvGrpSpPr>
-            <p:cNvPr id="52" name="Group 51">
+            <p:cNvPr id="99" name="Group 98">
               <a:extLst>
                 <a:ext uri="{FF2B5EF4-FFF2-40B4-BE49-F238E27FC236}">
-                  <a16:creationId xmlns:a16="http://schemas.microsoft.com/office/drawing/2014/main" id="{ADF846EE-BA33-AB5E-5342-1E03B28D76D0}"/>
+                  <a16:creationId xmlns:a16="http://schemas.microsoft.com/office/drawing/2014/main" id="{3F1FBD66-67DA-5B86-6111-152B51818C6C}"/>
                 </a:ext>
               </a:extLst>
             </p:cNvPr>
@@ -3812,10 +5199,10 @@
           </p:grpSpPr>
           <p:sp>
             <p:nvSpPr>
-              <p:cNvPr id="51" name="Arrow: U-Turn 50">
+              <p:cNvPr id="100" name="Arrow: U-Turn 99">
                 <a:extLst>
                   <a:ext uri="{FF2B5EF4-FFF2-40B4-BE49-F238E27FC236}">
-                    <a16:creationId xmlns:a16="http://schemas.microsoft.com/office/drawing/2014/main" id="{89122D84-E93B-5EB5-5D38-A6227C082BEA}"/>
+                    <a16:creationId xmlns:a16="http://schemas.microsoft.com/office/drawing/2014/main" id="{2B45E5BB-B252-1D38-5F66-5F7606A5E2F8}"/>
                   </a:ext>
                 </a:extLst>
               </p:cNvPr>
@@ -3876,10 +5263,10 @@
           </p:sp>
           <p:sp>
             <p:nvSpPr>
-              <p:cNvPr id="56" name="TextBox 55">
+              <p:cNvPr id="101" name="TextBox 100">
                 <a:extLst>
                   <a:ext uri="{FF2B5EF4-FFF2-40B4-BE49-F238E27FC236}">
-                    <a16:creationId xmlns:a16="http://schemas.microsoft.com/office/drawing/2014/main" id="{7BE49FB5-F484-3486-78CD-2BAE5E2BD790}"/>
+                    <a16:creationId xmlns:a16="http://schemas.microsoft.com/office/drawing/2014/main" id="{411D1716-D103-C08A-CDE7-540EE5F4A7AB}"/>
                   </a:ext>
                 </a:extLst>
               </p:cNvPr>
@@ -3913,10 +5300,10 @@
       </p:grpSp>
       <p:grpSp>
         <p:nvGrpSpPr>
-          <p:cNvPr id="59" name="Group 58">
-            <a:extLst>
-              <a:ext uri="{FF2B5EF4-FFF2-40B4-BE49-F238E27FC236}">
-                <a16:creationId xmlns:a16="http://schemas.microsoft.com/office/drawing/2014/main" id="{EDDF1FD7-B7F6-3464-81F2-FF0C765A7B86}"/>
+          <p:cNvPr id="102" name="Group 101">
+            <a:extLst>
+              <a:ext uri="{FF2B5EF4-FFF2-40B4-BE49-F238E27FC236}">
+                <a16:creationId xmlns:a16="http://schemas.microsoft.com/office/drawing/2014/main" id="{709C987B-08DB-2559-6504-830BE16EA5F5}"/>
               </a:ext>
             </a:extLst>
           </p:cNvPr>
@@ -3933,10 +5320,10 @@
         </p:grpSpPr>
         <p:sp>
           <p:nvSpPr>
-            <p:cNvPr id="60" name="Oval 59">
+            <p:cNvPr id="103" name="Oval 102">
               <a:extLst>
                 <a:ext uri="{FF2B5EF4-FFF2-40B4-BE49-F238E27FC236}">
-                  <a16:creationId xmlns:a16="http://schemas.microsoft.com/office/drawing/2014/main" id="{9B94DBF8-E675-6BC1-7A5E-69090B6A1025}"/>
+                  <a16:creationId xmlns:a16="http://schemas.microsoft.com/office/drawing/2014/main" id="{9EF6ECD9-63AA-0E85-E96A-B56C01AD4F83}"/>
                 </a:ext>
               </a:extLst>
             </p:cNvPr>
@@ -3994,10 +5381,10 @@
         </p:sp>
         <p:grpSp>
           <p:nvGrpSpPr>
-            <p:cNvPr id="61" name="Group 60">
+            <p:cNvPr id="104" name="Group 103">
               <a:extLst>
                 <a:ext uri="{FF2B5EF4-FFF2-40B4-BE49-F238E27FC236}">
-                  <a16:creationId xmlns:a16="http://schemas.microsoft.com/office/drawing/2014/main" id="{B7DFCEDA-90C6-7734-5905-58B30C9E8D0C}"/>
+                  <a16:creationId xmlns:a16="http://schemas.microsoft.com/office/drawing/2014/main" id="{50612271-5613-0FEC-19E2-F426761E74C6}"/>
                 </a:ext>
               </a:extLst>
             </p:cNvPr>
@@ -4014,10 +5401,10 @@
           </p:grpSpPr>
           <p:sp>
             <p:nvSpPr>
-              <p:cNvPr id="62" name="Arrow: U-Turn 61">
+              <p:cNvPr id="105" name="Arrow: U-Turn 104">
                 <a:extLst>
                   <a:ext uri="{FF2B5EF4-FFF2-40B4-BE49-F238E27FC236}">
-                    <a16:creationId xmlns:a16="http://schemas.microsoft.com/office/drawing/2014/main" id="{AACFF243-CD19-DE6C-570C-C6306BB457DE}"/>
+                    <a16:creationId xmlns:a16="http://schemas.microsoft.com/office/drawing/2014/main" id="{39A3FBA7-34DA-BCBF-5CBB-4E5BF4E0D184}"/>
                   </a:ext>
                 </a:extLst>
               </p:cNvPr>
@@ -4078,10 +5465,10 @@
           </p:sp>
           <p:sp>
             <p:nvSpPr>
-              <p:cNvPr id="64" name="TextBox 63">
+              <p:cNvPr id="106" name="TextBox 105">
                 <a:extLst>
                   <a:ext uri="{FF2B5EF4-FFF2-40B4-BE49-F238E27FC236}">
-                    <a16:creationId xmlns:a16="http://schemas.microsoft.com/office/drawing/2014/main" id="{9C900E1D-AFC5-1D3E-366D-E1D13D8E35E1}"/>
+                    <a16:creationId xmlns:a16="http://schemas.microsoft.com/office/drawing/2014/main" id="{1EC06D05-45D1-0621-43AD-DC8C1601C717}"/>
                   </a:ext>
                 </a:extLst>
               </p:cNvPr>
@@ -4116,7 +5503,7 @@
     </p:spTree>
     <p:extLst>
       <p:ext uri="{BB962C8B-B14F-4D97-AF65-F5344CB8AC3E}">
-        <p14:creationId xmlns:p14="http://schemas.microsoft.com/office/powerpoint/2010/main" val="2286304767"/>
+        <p14:creationId xmlns:p14="http://schemas.microsoft.com/office/powerpoint/2010/main" val="174225236"/>
       </p:ext>
     </p:extLst>
   </p:cSld>

</xml_diff>